<commit_message>
Modify sort and select theme sequence diagrams
</commit_message>
<xml_diff>
--- a/docs/diagrams/SelectThemeSequenceDiagram.pptx
+++ b/docs/diagrams/SelectThemeSequenceDiagram.pptx
@@ -126,6 +126,10 @@
 </p:presentation>
 </file>
 
+<file path=ppt/revisionInfo.xml><?xml version="1.0" encoding="utf-8"?>
+<p1510:revInfo xmlns:a="http://schemas.openxmlformats.org/drawingml/2006/main" xmlns:r="http://schemas.openxmlformats.org/officeDocument/2006/relationships" xmlns:p1510="http://schemas.microsoft.com/office/powerpoint/2015/10/main"/>
+</file>
+
 <file path=ppt/notesMasters/notesMaster1.xml><?xml version="1.0" encoding="utf-8"?>
 <p:notesMaster xmlns:a="http://schemas.openxmlformats.org/drawingml/2006/main" xmlns:r="http://schemas.openxmlformats.org/officeDocument/2006/relationships" xmlns:p="http://schemas.openxmlformats.org/presentationml/2006/main">
   <p:cSld>
@@ -208,7 +212,7 @@
           <a:p>
             <a:fld id="{F5CC4B3F-88C1-4FFA-B1B6-F41C21DC6924}" type="datetimeFigureOut">
               <a:rPr lang="en-US" smtClean="0"/>
-              <a:t>10/28/2017</a:t>
+              <a:t>10/29/2017</a:t>
             </a:fld>
             <a:endParaRPr lang="en-US"/>
           </a:p>
@@ -654,7 +658,7 @@
           <a:p>
             <a:fld id="{78C97017-6FC3-485B-9764-EAC9E56C1D49}" type="datetimeFigureOut">
               <a:rPr lang="en-US" smtClean="0"/>
-              <a:t>10/28/2017</a:t>
+              <a:t>10/29/2017</a:t>
             </a:fld>
             <a:endParaRPr lang="en-US"/>
           </a:p>
@@ -822,7 +826,7 @@
           <a:p>
             <a:fld id="{78C97017-6FC3-485B-9764-EAC9E56C1D49}" type="datetimeFigureOut">
               <a:rPr lang="en-US" smtClean="0"/>
-              <a:t>10/28/2017</a:t>
+              <a:t>10/29/2017</a:t>
             </a:fld>
             <a:endParaRPr lang="en-US"/>
           </a:p>
@@ -1000,7 +1004,7 @@
           <a:p>
             <a:fld id="{78C97017-6FC3-485B-9764-EAC9E56C1D49}" type="datetimeFigureOut">
               <a:rPr lang="en-US" smtClean="0"/>
-              <a:t>10/28/2017</a:t>
+              <a:t>10/29/2017</a:t>
             </a:fld>
             <a:endParaRPr lang="en-US"/>
           </a:p>
@@ -1168,7 +1172,7 @@
           <a:p>
             <a:fld id="{78C97017-6FC3-485B-9764-EAC9E56C1D49}" type="datetimeFigureOut">
               <a:rPr lang="en-US" smtClean="0"/>
-              <a:t>10/28/2017</a:t>
+              <a:t>10/29/2017</a:t>
             </a:fld>
             <a:endParaRPr lang="en-US"/>
           </a:p>
@@ -1413,7 +1417,7 @@
           <a:p>
             <a:fld id="{78C97017-6FC3-485B-9764-EAC9E56C1D49}" type="datetimeFigureOut">
               <a:rPr lang="en-US" smtClean="0"/>
-              <a:t>10/28/2017</a:t>
+              <a:t>10/29/2017</a:t>
             </a:fld>
             <a:endParaRPr lang="en-US"/>
           </a:p>
@@ -1698,7 +1702,7 @@
           <a:p>
             <a:fld id="{78C97017-6FC3-485B-9764-EAC9E56C1D49}" type="datetimeFigureOut">
               <a:rPr lang="en-US" smtClean="0"/>
-              <a:t>10/28/2017</a:t>
+              <a:t>10/29/2017</a:t>
             </a:fld>
             <a:endParaRPr lang="en-US"/>
           </a:p>
@@ -2117,7 +2121,7 @@
           <a:p>
             <a:fld id="{78C97017-6FC3-485B-9764-EAC9E56C1D49}" type="datetimeFigureOut">
               <a:rPr lang="en-US" smtClean="0"/>
-              <a:t>10/28/2017</a:t>
+              <a:t>10/29/2017</a:t>
             </a:fld>
             <a:endParaRPr lang="en-US"/>
           </a:p>
@@ -2234,7 +2238,7 @@
           <a:p>
             <a:fld id="{78C97017-6FC3-485B-9764-EAC9E56C1D49}" type="datetimeFigureOut">
               <a:rPr lang="en-US" smtClean="0"/>
-              <a:t>10/28/2017</a:t>
+              <a:t>10/29/2017</a:t>
             </a:fld>
             <a:endParaRPr lang="en-US"/>
           </a:p>
@@ -2329,7 +2333,7 @@
           <a:p>
             <a:fld id="{78C97017-6FC3-485B-9764-EAC9E56C1D49}" type="datetimeFigureOut">
               <a:rPr lang="en-US" smtClean="0"/>
-              <a:t>10/28/2017</a:t>
+              <a:t>10/29/2017</a:t>
             </a:fld>
             <a:endParaRPr lang="en-US"/>
           </a:p>
@@ -2604,7 +2608,7 @@
           <a:p>
             <a:fld id="{78C97017-6FC3-485B-9764-EAC9E56C1D49}" type="datetimeFigureOut">
               <a:rPr lang="en-US" smtClean="0"/>
-              <a:t>10/28/2017</a:t>
+              <a:t>10/29/2017</a:t>
             </a:fld>
             <a:endParaRPr lang="en-US"/>
           </a:p>
@@ -2856,7 +2860,7 @@
           <a:p>
             <a:fld id="{78C97017-6FC3-485B-9764-EAC9E56C1D49}" type="datetimeFigureOut">
               <a:rPr lang="en-US" smtClean="0"/>
-              <a:t>10/28/2017</a:t>
+              <a:t>10/29/2017</a:t>
             </a:fld>
             <a:endParaRPr lang="en-US"/>
           </a:p>
@@ -3067,7 +3071,7 @@
           <a:p>
             <a:fld id="{78C97017-6FC3-485B-9764-EAC9E56C1D49}" type="datetimeFigureOut">
               <a:rPr lang="en-US" smtClean="0"/>
-              <a:t>10/28/2017</a:t>
+              <a:t>10/29/2017</a:t>
             </a:fld>
             <a:endParaRPr lang="en-US"/>
           </a:p>
@@ -3450,8 +3454,8 @@
         </p:nvSpPr>
         <p:spPr>
           <a:xfrm>
-            <a:off x="560022" y="1752600"/>
-            <a:ext cx="8507777" cy="4431166"/>
+            <a:off x="0" y="1752600"/>
+            <a:ext cx="9144000" cy="4419600"/>
           </a:xfrm>
           <a:prstGeom prst="roundRect">
             <a:avLst>

</xml_diff>